<commit_message>
react-simple: for lesson8 :react DIY
</commit_message>
<xml_diff>
--- a/lecture/js.pptx
+++ b/lecture/js.pptx
@@ -37,10 +37,10 @@
     <p:sldId id="285" r:id="rId32"/>
     <p:sldId id="282" r:id="rId33"/>
     <p:sldId id="287" r:id="rId34"/>
-    <p:sldId id="289" r:id="rId35"/>
-    <p:sldId id="288" r:id="rId36"/>
-    <p:sldId id="290" r:id="rId37"/>
-    <p:sldId id="291" r:id="rId38"/>
+    <p:sldId id="290" r:id="rId35"/>
+    <p:sldId id="291" r:id="rId36"/>
+    <p:sldId id="292" r:id="rId37"/>
+    <p:sldId id="293" r:id="rId38"/>
   </p:sldIdLst>
   <p:sldSz cx="9144000" cy="6858000" type="screen4x3"/>
   <p:notesSz cx="6858000" cy="9144000"/>
@@ -13733,7 +13733,7 @@
           <a:p>
             <a:r>
               <a:rPr lang="en-US" altLang="zh-CN"/>
-              <a:t>useState,useEffect </a:t>
+              <a:t>Simple React</a:t>
             </a:r>
             <a:endParaRPr lang="en-US" altLang="zh-CN"/>
           </a:p>
@@ -13741,10 +13741,8 @@
       </p:sp>
       <p:sp>
         <p:nvSpPr>
-          <p:cNvPr id="3" name="内容占位符 2"/>
-          <p:cNvSpPr>
-            <a:spLocks noGrp="1"/>
-          </p:cNvSpPr>
+          <p:cNvPr id="4" name="内容占位符 3"/>
+          <p:cNvSpPr/>
           <p:nvPr>
             <p:ph idx="1"/>
           </p:nvPr>
@@ -13753,7 +13751,21 @@
         <p:txBody>
           <a:bodyPr/>
           <a:p>
-            <a:endParaRPr lang="zh-CN" altLang="en-US"/>
+            <a:r>
+              <a:rPr lang="en-US" altLang="zh-CN"/>
+              <a:t>const ele=(&lt;div&gt;test&lt;/div&gt;)jsx</a:t>
+            </a:r>
+            <a:endParaRPr lang="en-US" altLang="zh-CN"/>
+          </a:p>
+          <a:p>
+            <a:endParaRPr lang="en-US" altLang="zh-CN"/>
+          </a:p>
+          <a:p>
+            <a:r>
+              <a:rPr lang="en-US" altLang="zh-CN"/>
+              <a:t>CreateElement(“div”,{})</a:t>
+            </a:r>
+            <a:endParaRPr lang="en-US" altLang="zh-CN"/>
           </a:p>
         </p:txBody>
       </p:sp>
@@ -13790,18 +13802,16 @@
           <a:bodyPr/>
           <a:p>
             <a:r>
-              <a:rPr lang="en-US" altLang="zh-CN">
-                <a:sym typeface="+mn-ea"/>
-              </a:rPr>
-              <a:t>forwardRef</a:t>
-            </a:r>
-            <a:endParaRPr lang="zh-CN" altLang="en-US"/>
+              <a:rPr lang="en-US" altLang="zh-CN"/>
+              <a:t>Simple React</a:t>
+            </a:r>
+            <a:endParaRPr lang="en-US" altLang="zh-CN"/>
           </a:p>
         </p:txBody>
       </p:sp>
       <p:sp>
         <p:nvSpPr>
-          <p:cNvPr id="5" name="内容占位符 4"/>
+          <p:cNvPr id="3" name="内容占位符 2"/>
           <p:cNvSpPr>
             <a:spLocks noGrp="1"/>
           </p:cNvSpPr>
@@ -13811,535 +13821,323 @@
         </p:nvSpPr>
         <p:spPr>
           <a:xfrm>
-            <a:off x="251460" y="1557020"/>
-            <a:ext cx="8229600" cy="4525963"/>
+            <a:off x="457200" y="1600200"/>
+            <a:ext cx="8229600" cy="5139690"/>
           </a:xfrm>
         </p:spPr>
         <p:txBody>
           <a:bodyPr/>
           <a:p>
-            <a:pPr marL="0" indent="0">
-              <a:buNone/>
-            </a:pPr>
-            <a:r>
-              <a:rPr lang="en-US" altLang="zh-CN" sz="1400">
-                <a:sym typeface="+mn-ea"/>
-              </a:rPr>
-              <a:t>// </a:t>
-            </a:r>
-            <a:r>
-              <a:rPr lang="zh-CN" altLang="en-US" sz="1400">
-                <a:sym typeface="+mn-ea"/>
-              </a:rPr>
-              <a:t>子组件</a:t>
+            <a:r>
+              <a:rPr lang="en-US" altLang="zh-CN" sz="1400"/>
+              <a:t>&lt;App&gt;</a:t>
+            </a:r>
+            <a:endParaRPr lang="en-US" altLang="zh-CN" sz="1400"/>
+          </a:p>
+          <a:p>
+            <a:r>
+              <a:rPr lang="en-US" altLang="zh-CN" sz="1400"/>
+              <a:t>  &lt;Header /&gt;</a:t>
+            </a:r>
+            <a:endParaRPr lang="en-US" altLang="zh-CN" sz="1400"/>
+          </a:p>
+          <a:p>
+            <a:r>
+              <a:rPr lang="en-US" altLang="zh-CN" sz="1400"/>
+              <a:t>  &lt;Content /&gt;</a:t>
+            </a:r>
+            <a:endParaRPr lang="en-US" altLang="zh-CN" sz="1400"/>
+          </a:p>
+          <a:p>
+            <a:r>
+              <a:rPr lang="en-US" altLang="zh-CN" sz="1400"/>
+              <a:t>&lt;/App&gt;</a:t>
+            </a:r>
+            <a:endParaRPr lang="en-US" altLang="zh-CN" sz="1400"/>
+          </a:p>
+          <a:p>
+            <a:r>
+              <a:rPr lang="zh-CN" altLang="en-US" sz="1400"/>
+              <a:t>递归流程：</a:t>
+            </a:r>
+            <a:endParaRPr lang="en-US" altLang="zh-CN" sz="1400"/>
+          </a:p>
+          <a:p>
+            <a:pPr marL="0" indent="0">
+              <a:buNone/>
+            </a:pPr>
+            <a:r>
+              <a:rPr lang="en-US" altLang="zh-CN" sz="1400"/>
+              <a:t>_render(App) </a:t>
+            </a:r>
+            <a:r>
+              <a:rPr lang="en-US" altLang="en-US" sz="1400"/>
+              <a:t>→</a:t>
+            </a:r>
+            <a:r>
+              <a:rPr lang="en-US" altLang="zh-CN" sz="1400"/>
+              <a:t> </a:t>
+            </a:r>
+            <a:r>
+              <a:rPr lang="zh-CN" altLang="en-US" sz="1400"/>
+              <a:t>发现类组件</a:t>
+            </a:r>
+            <a:r>
+              <a:rPr lang="en-US" altLang="zh-CN" sz="1400"/>
+              <a:t> </a:t>
+            </a:r>
+            <a:r>
+              <a:rPr lang="en-US" altLang="en-US" sz="1400"/>
+              <a:t>→</a:t>
+            </a:r>
+            <a:r>
+              <a:rPr lang="en-US" altLang="zh-CN" sz="1400"/>
+              <a:t> </a:t>
+            </a:r>
+            <a:r>
+              <a:rPr lang="zh-CN" altLang="en-US" sz="1400"/>
+              <a:t>调用</a:t>
+            </a:r>
+            <a:r>
+              <a:rPr lang="en-US" altLang="zh-CN" sz="1400"/>
+              <a:t> App.render()</a:t>
+            </a:r>
+            <a:endParaRPr lang="en-US" altLang="zh-CN" sz="1400"/>
+          </a:p>
+          <a:p>
+            <a:endParaRPr lang="en-US" altLang="zh-CN" sz="1400"/>
+          </a:p>
+          <a:p>
+            <a:pPr marL="0" indent="0">
+              <a:buNone/>
+            </a:pPr>
+            <a:r>
+              <a:rPr lang="zh-CN" altLang="en-US" sz="1400"/>
+              <a:t>得到</a:t>
+            </a:r>
+            <a:r>
+              <a:rPr lang="en-US" altLang="zh-CN" sz="1400"/>
+              <a:t> &lt;div&gt;&lt;Header /&gt;&lt;Content /&gt;&lt;/div&gt;</a:t>
+            </a:r>
+            <a:endParaRPr lang="en-US" altLang="zh-CN" sz="1400"/>
+          </a:p>
+          <a:p>
+            <a:endParaRPr lang="en-US" altLang="zh-CN" sz="1400"/>
+          </a:p>
+          <a:p>
+            <a:pPr marL="0" indent="0">
+              <a:buNone/>
+            </a:pPr>
+            <a:r>
+              <a:rPr lang="en-US" altLang="zh-CN" sz="1400"/>
+              <a:t>_render(div) </a:t>
+            </a:r>
+            <a:r>
+              <a:rPr lang="en-US" altLang="en-US" sz="1400"/>
+              <a:t>→</a:t>
+            </a:r>
+            <a:r>
+              <a:rPr lang="en-US" altLang="zh-CN" sz="1400"/>
+              <a:t> </a:t>
+            </a:r>
+            <a:r>
+              <a:rPr lang="zh-CN" altLang="en-US" sz="1400"/>
+              <a:t>创建</a:t>
+            </a:r>
+            <a:r>
+              <a:rPr lang="en-US" altLang="zh-CN" sz="1400"/>
+              <a:t> &lt;div&gt; </a:t>
+            </a:r>
+            <a:r>
+              <a:rPr lang="en-US" altLang="en-US" sz="1400"/>
+              <a:t>→</a:t>
+            </a:r>
+            <a:r>
+              <a:rPr lang="en-US" altLang="zh-CN" sz="1400"/>
+              <a:t> </a:t>
+            </a:r>
+            <a:r>
+              <a:rPr lang="zh-CN" altLang="en-US" sz="1400"/>
+              <a:t>处理子节点：</a:t>
             </a:r>
             <a:endParaRPr lang="zh-CN" altLang="en-US" sz="1400"/>
           </a:p>
           <a:p>
-            <a:pPr marL="0" indent="0">
-              <a:buNone/>
-            </a:pPr>
-            <a:r>
-              <a:rPr lang="en-US" altLang="zh-CN" sz="1400">
-                <a:sym typeface="+mn-ea"/>
-              </a:rPr>
-              <a:t>const </a:t>
-            </a:r>
-            <a:r>
-              <a:rPr lang="en-US" altLang="zh-CN" sz="1400">
-                <a:solidFill>
-                  <a:srgbClr val="FF0000"/>
-                </a:solidFill>
-                <a:sym typeface="+mn-ea"/>
-              </a:rPr>
-              <a:t>ChildForm </a:t>
-            </a:r>
-            <a:r>
-              <a:rPr lang="en-US" altLang="zh-CN" sz="1400">
-                <a:sym typeface="+mn-ea"/>
-              </a:rPr>
-              <a:t>= forwardRef((props, ref) =&gt; {</a:t>
-            </a:r>
-            <a:endParaRPr lang="en-US" altLang="zh-CN" sz="1400"/>
-          </a:p>
-          <a:p>
-            <a:pPr marL="0" indent="0">
-              <a:buNone/>
-            </a:pPr>
-            <a:r>
-              <a:rPr lang="en-US" altLang="zh-CN" sz="1400">
-                <a:sym typeface="+mn-ea"/>
-              </a:rPr>
-              <a:t>  const [form] = Form.useForm();</a:t>
-            </a:r>
-            <a:endParaRPr lang="en-US" altLang="zh-CN" sz="1400"/>
-          </a:p>
-          <a:p>
-            <a:pPr marL="0" indent="0">
-              <a:buNone/>
-            </a:pPr>
-            <a:r>
-              <a:rPr lang="en-US" altLang="zh-CN" sz="1400">
-                <a:sym typeface="+mn-ea"/>
-              </a:rPr>
-              <a:t>  useImperativeHandle(ref, () =&gt; ({</a:t>
-            </a:r>
-            <a:endParaRPr lang="en-US" altLang="zh-CN" sz="1400"/>
-          </a:p>
-          <a:p>
-            <a:pPr marL="0" indent="0">
-              <a:buNone/>
-            </a:pPr>
-            <a:r>
-              <a:rPr lang="en-US" altLang="zh-CN" sz="1400">
-                <a:sym typeface="+mn-ea"/>
-              </a:rPr>
-              <a:t>    submit: async () =&gt; {</a:t>
-            </a:r>
-            <a:endParaRPr lang="en-US" altLang="zh-CN" sz="1400"/>
-          </a:p>
-          <a:p>
-            <a:pPr marL="0" indent="0">
-              <a:buNone/>
-            </a:pPr>
-            <a:r>
-              <a:rPr lang="en-US" altLang="zh-CN" sz="1400">
-                <a:sym typeface="+mn-ea"/>
-              </a:rPr>
-              <a:t>      try { return await form.validateFields();</a:t>
-            </a:r>
-            <a:endParaRPr lang="en-US" altLang="zh-CN" sz="1400"/>
-          </a:p>
-          <a:p>
-            <a:pPr marL="0" indent="0">
-              <a:buNone/>
-            </a:pPr>
-            <a:r>
-              <a:rPr lang="en-US" altLang="zh-CN" sz="1400">
-                <a:sym typeface="+mn-ea"/>
-              </a:rPr>
-              <a:t>      } catch (e) {</a:t>
-            </a:r>
-            <a:endParaRPr lang="en-US" altLang="zh-CN" sz="1400"/>
-          </a:p>
-          <a:p>
-            <a:pPr marL="0" indent="0">
-              <a:buNone/>
-            </a:pPr>
-            <a:r>
-              <a:rPr lang="en-US" altLang="zh-CN" sz="1400">
-                <a:sym typeface="+mn-ea"/>
-              </a:rPr>
-              <a:t>        console.error('</a:t>
-            </a:r>
-            <a:r>
-              <a:rPr lang="zh-CN" altLang="en-US" sz="1400">
-                <a:sym typeface="+mn-ea"/>
-              </a:rPr>
-              <a:t>验证失败</a:t>
-            </a:r>
-            <a:r>
-              <a:rPr lang="en-US" altLang="zh-CN" sz="1400">
-                <a:sym typeface="+mn-ea"/>
-              </a:rPr>
-              <a:t>', e);</a:t>
-            </a:r>
-            <a:endParaRPr lang="en-US" altLang="zh-CN" sz="1400"/>
-          </a:p>
-          <a:p>
-            <a:pPr marL="0" indent="0">
-              <a:buNone/>
-            </a:pPr>
-            <a:r>
-              <a:rPr lang="en-US" altLang="zh-CN" sz="1400">
-                <a:sym typeface="+mn-ea"/>
-              </a:rPr>
-              <a:t>        throw e;</a:t>
-            </a:r>
-            <a:endParaRPr lang="en-US" altLang="zh-CN" sz="1400"/>
-          </a:p>
-          <a:p>
-            <a:pPr marL="0" indent="0">
-              <a:buNone/>
-            </a:pPr>
-            <a:r>
-              <a:rPr lang="en-US" altLang="zh-CN" sz="1400">
-                <a:sym typeface="+mn-ea"/>
-              </a:rPr>
-              <a:t>      }},</a:t>
-            </a:r>
-            <a:endParaRPr lang="en-US" altLang="zh-CN" sz="1400"/>
-          </a:p>
-          <a:p>
-            <a:pPr marL="0" indent="0">
-              <a:buNone/>
-            </a:pPr>
-            <a:r>
-              <a:rPr lang="en-US" altLang="zh-CN" sz="1400">
-                <a:sym typeface="+mn-ea"/>
-              </a:rPr>
-              <a:t>    reset: () =&gt; form.resetFields()</a:t>
-            </a:r>
-            <a:endParaRPr lang="en-US" altLang="zh-CN" sz="1400"/>
-          </a:p>
-          <a:p>
-            <a:pPr marL="0" indent="0">
-              <a:buNone/>
-            </a:pPr>
-            <a:r>
-              <a:rPr lang="en-US" altLang="zh-CN" sz="1400">
-                <a:sym typeface="+mn-ea"/>
-              </a:rPr>
-              <a:t>  }));</a:t>
-            </a:r>
-            <a:endParaRPr lang="en-US" altLang="zh-CN" sz="1400"/>
-          </a:p>
-          <a:p>
-            <a:pPr marL="0" indent="0">
-              <a:buNone/>
-            </a:pPr>
-            <a:r>
-              <a:rPr lang="en-US" altLang="zh-CN" sz="1400">
-                <a:sym typeface="+mn-ea"/>
-              </a:rPr>
-              <a:t>  return &lt;Form form={form}&gt;{/* ... */}&lt;/Form&gt;;</a:t>
-            </a:r>
-            <a:endParaRPr lang="en-US" altLang="zh-CN" sz="1400"/>
-          </a:p>
-          <a:p>
-            <a:pPr marL="0" indent="0">
-              <a:buNone/>
-            </a:pPr>
-            <a:r>
-              <a:rPr lang="en-US" altLang="zh-CN" sz="1400">
-                <a:sym typeface="+mn-ea"/>
-              </a:rPr>
-              <a:t>});</a:t>
-            </a:r>
-            <a:endParaRPr lang="en-US" altLang="zh-CN" sz="1400">
-              <a:sym typeface="+mn-ea"/>
-            </a:endParaRPr>
-          </a:p>
-          <a:p>
-            <a:pPr marL="0" indent="0">
-              <a:buNone/>
-            </a:pPr>
-            <a:endParaRPr lang="en-US" altLang="zh-CN" sz="1600">
-              <a:sym typeface="+mn-ea"/>
-            </a:endParaRPr>
-          </a:p>
-          <a:p>
-            <a:pPr marL="0" indent="0">
-              <a:buNone/>
-            </a:pPr>
-            <a:endParaRPr lang="en-US" altLang="zh-CN" sz="1600"/>
-          </a:p>
-        </p:txBody>
-      </p:sp>
-      <p:sp>
-        <p:nvSpPr>
-          <p:cNvPr id="6" name="文本框 5"/>
-          <p:cNvSpPr txBox="1"/>
-          <p:nvPr/>
-        </p:nvSpPr>
-        <p:spPr>
-          <a:xfrm>
-            <a:off x="5292090" y="1557020"/>
-            <a:ext cx="4572000" cy="4615815"/>
-          </a:xfrm>
-          <a:prstGeom prst="rect">
-            <a:avLst/>
-          </a:prstGeom>
-          <a:noFill/>
-        </p:spPr>
-        <p:txBody>
-          <a:bodyPr wrap="square" rtlCol="0" anchor="t">
-            <a:spAutoFit/>
-          </a:bodyPr>
-          <a:p>
-            <a:pPr marL="0" indent="0">
-              <a:buNone/>
-            </a:pPr>
-            <a:r>
-              <a:rPr lang="en-US" altLang="zh-CN" sz="1400">
-                <a:sym typeface="+mn-ea"/>
-              </a:rPr>
-              <a:t>// </a:t>
-            </a:r>
-            <a:r>
-              <a:rPr lang="zh-CN" altLang="en-US" sz="1400">
-                <a:sym typeface="+mn-ea"/>
-              </a:rPr>
-              <a:t>父组件</a:t>
+            <a:endParaRPr lang="en-US" altLang="zh-CN" sz="1400"/>
+          </a:p>
+          <a:p>
+            <a:pPr marL="0" indent="0">
+              <a:buNone/>
+            </a:pPr>
+            <a:r>
+              <a:rPr lang="en-US" altLang="zh-CN" sz="1400"/>
+              <a:t>_render(Header) </a:t>
+            </a:r>
+            <a:r>
+              <a:rPr lang="en-US" altLang="en-US" sz="1400"/>
+              <a:t>→</a:t>
+            </a:r>
+            <a:r>
+              <a:rPr lang="en-US" altLang="zh-CN" sz="1400"/>
+              <a:t> </a:t>
+            </a:r>
+            <a:r>
+              <a:rPr lang="zh-CN" altLang="en-US" sz="1400"/>
+              <a:t>函数组件</a:t>
+            </a:r>
+            <a:r>
+              <a:rPr lang="en-US" altLang="zh-CN" sz="1400"/>
+              <a:t> </a:t>
+            </a:r>
+            <a:r>
+              <a:rPr lang="en-US" altLang="en-US" sz="1400"/>
+              <a:t>→</a:t>
+            </a:r>
+            <a:r>
+              <a:rPr lang="en-US" altLang="zh-CN" sz="1400"/>
+              <a:t> </a:t>
+            </a:r>
+            <a:r>
+              <a:rPr lang="zh-CN" altLang="en-US" sz="1400"/>
+              <a:t>调用</a:t>
+            </a:r>
+            <a:r>
+              <a:rPr lang="en-US" altLang="zh-CN" sz="1400"/>
+              <a:t> Header()</a:t>
+            </a:r>
+            <a:endParaRPr lang="en-US" altLang="zh-CN" sz="1400"/>
+          </a:p>
+          <a:p>
+            <a:endParaRPr lang="en-US" altLang="zh-CN" sz="1400"/>
+          </a:p>
+          <a:p>
+            <a:pPr marL="0" indent="0">
+              <a:buNone/>
+            </a:pPr>
+            <a:r>
+              <a:rPr lang="zh-CN" altLang="en-US" sz="1400"/>
+              <a:t>得到</a:t>
+            </a:r>
+            <a:r>
+              <a:rPr lang="en-US" altLang="zh-CN" sz="1400"/>
+              <a:t> &lt;h1&gt;Title&lt;/h1&gt; </a:t>
+            </a:r>
+            <a:r>
+              <a:rPr lang="en-US" altLang="en-US" sz="1400"/>
+              <a:t>→</a:t>
+            </a:r>
+            <a:r>
+              <a:rPr lang="en-US" altLang="zh-CN" sz="1400"/>
+              <a:t> </a:t>
+            </a:r>
+            <a:r>
+              <a:rPr lang="zh-CN" altLang="en-US" sz="1400"/>
+              <a:t>创建</a:t>
+            </a:r>
+            <a:r>
+              <a:rPr lang="en-US" altLang="zh-CN" sz="1400"/>
+              <a:t> &lt;h1&gt;</a:t>
+            </a:r>
+            <a:endParaRPr lang="en-US" altLang="zh-CN" sz="1400"/>
+          </a:p>
+          <a:p>
+            <a:endParaRPr lang="en-US" altLang="zh-CN" sz="1400"/>
+          </a:p>
+          <a:p>
+            <a:pPr marL="0" indent="0">
+              <a:buNone/>
+            </a:pPr>
+            <a:r>
+              <a:rPr lang="en-US" altLang="zh-CN" sz="1400"/>
+              <a:t>_render(Content) </a:t>
+            </a:r>
+            <a:r>
+              <a:rPr lang="en-US" altLang="en-US" sz="1400"/>
+              <a:t>→</a:t>
+            </a:r>
+            <a:r>
+              <a:rPr lang="en-US" altLang="zh-CN" sz="1400"/>
+              <a:t> </a:t>
+            </a:r>
+            <a:r>
+              <a:rPr lang="zh-CN" altLang="en-US" sz="1400"/>
+              <a:t>类组件</a:t>
+            </a:r>
+            <a:r>
+              <a:rPr lang="en-US" altLang="zh-CN" sz="1400"/>
+              <a:t> </a:t>
+            </a:r>
+            <a:r>
+              <a:rPr lang="en-US" altLang="en-US" sz="1400"/>
+              <a:t>→</a:t>
+            </a:r>
+            <a:r>
+              <a:rPr lang="en-US" altLang="zh-CN" sz="1400"/>
+              <a:t> </a:t>
+            </a:r>
+            <a:r>
+              <a:rPr lang="zh-CN" altLang="en-US" sz="1400"/>
+              <a:t>调用</a:t>
+            </a:r>
+            <a:r>
+              <a:rPr lang="en-US" altLang="zh-CN" sz="1400"/>
+              <a:t> Content.render()</a:t>
+            </a:r>
+            <a:endParaRPr lang="en-US" altLang="zh-CN" sz="1400"/>
+          </a:p>
+          <a:p>
+            <a:endParaRPr lang="en-US" altLang="zh-CN" sz="1400"/>
+          </a:p>
+          <a:p>
+            <a:pPr marL="0" indent="0">
+              <a:buNone/>
+            </a:pPr>
+            <a:r>
+              <a:rPr lang="zh-CN" altLang="en-US" sz="1400"/>
+              <a:t>得到</a:t>
+            </a:r>
+            <a:r>
+              <a:rPr lang="en-US" altLang="zh-CN" sz="1400"/>
+              <a:t> &lt;section&gt;...&lt;/section&gt; </a:t>
+            </a:r>
+            <a:r>
+              <a:rPr lang="en-US" altLang="en-US" sz="1400"/>
+              <a:t>→</a:t>
+            </a:r>
+            <a:r>
+              <a:rPr lang="en-US" altLang="zh-CN" sz="1400"/>
+              <a:t> </a:t>
+            </a:r>
+            <a:r>
+              <a:rPr lang="zh-CN" altLang="en-US" sz="1400"/>
+              <a:t>创建</a:t>
+            </a:r>
+            <a:r>
+              <a:rPr lang="en-US" altLang="zh-CN" sz="1400"/>
+              <a:t> &lt;section&gt;</a:t>
+            </a:r>
+            <a:endParaRPr lang="en-US" altLang="zh-CN" sz="1400"/>
+          </a:p>
+          <a:p>
+            <a:endParaRPr lang="en-US" altLang="zh-CN" sz="1400"/>
+          </a:p>
+          <a:p>
+            <a:pPr marL="0" indent="0">
+              <a:buNone/>
+            </a:pPr>
+            <a:r>
+              <a:rPr lang="zh-CN" altLang="en-US" sz="1400"/>
+              <a:t>最终构建完整的</a:t>
+            </a:r>
+            <a:r>
+              <a:rPr lang="en-US" altLang="zh-CN" sz="1400"/>
+              <a:t>DOM</a:t>
+            </a:r>
+            <a:r>
+              <a:rPr lang="zh-CN" altLang="en-US" sz="1400"/>
+              <a:t>树</a:t>
             </a:r>
             <a:endParaRPr lang="zh-CN" altLang="en-US" sz="1400"/>
-          </a:p>
-          <a:p>
-            <a:pPr marL="0" indent="0">
-              <a:buNone/>
-            </a:pPr>
-            <a:r>
-              <a:rPr lang="en-US" altLang="zh-CN" sz="1400">
-                <a:sym typeface="+mn-ea"/>
-              </a:rPr>
-              <a:t>function </a:t>
-            </a:r>
-            <a:r>
-              <a:rPr lang="en-US" altLang="zh-CN" sz="1400">
-                <a:solidFill>
-                  <a:srgbClr val="FF0000"/>
-                </a:solidFill>
-                <a:sym typeface="+mn-ea"/>
-              </a:rPr>
-              <a:t>Parent</a:t>
-            </a:r>
-            <a:r>
-              <a:rPr lang="en-US" altLang="zh-CN" sz="1400">
-                <a:sym typeface="+mn-ea"/>
-              </a:rPr>
-              <a:t>() {</a:t>
-            </a:r>
-            <a:endParaRPr lang="en-US" altLang="zh-CN" sz="1400"/>
-          </a:p>
-          <a:p>
-            <a:pPr marL="0" indent="0">
-              <a:buNone/>
-            </a:pPr>
-            <a:r>
-              <a:rPr lang="en-US" altLang="zh-CN" sz="1400">
-                <a:sym typeface="+mn-ea"/>
-              </a:rPr>
-              <a:t>  const formRef = useRef();</a:t>
-            </a:r>
-            <a:endParaRPr lang="en-US" altLang="zh-CN" sz="1400"/>
-          </a:p>
-          <a:p>
-            <a:pPr marL="0" indent="0">
-              <a:buNone/>
-            </a:pPr>
-            <a:r>
-              <a:rPr lang="en-US" altLang="zh-CN" sz="1400">
-                <a:sym typeface="+mn-ea"/>
-              </a:rPr>
-              <a:t>  </a:t>
-            </a:r>
-            <a:endParaRPr lang="en-US" altLang="zh-CN" sz="1400"/>
-          </a:p>
-          <a:p>
-            <a:pPr marL="0" indent="0">
-              <a:buNone/>
-            </a:pPr>
-            <a:r>
-              <a:rPr lang="en-US" altLang="zh-CN" sz="1400">
-                <a:sym typeface="+mn-ea"/>
-              </a:rPr>
-              <a:t>  const handleSubmit = async () =&gt; {</a:t>
-            </a:r>
-            <a:endParaRPr lang="en-US" altLang="zh-CN" sz="1400"/>
-          </a:p>
-          <a:p>
-            <a:pPr marL="0" indent="0">
-              <a:buNone/>
-            </a:pPr>
-            <a:r>
-              <a:rPr lang="en-US" altLang="zh-CN" sz="1400">
-                <a:sym typeface="+mn-ea"/>
-              </a:rPr>
-              <a:t>    try {</a:t>
-            </a:r>
-            <a:endParaRPr lang="en-US" altLang="zh-CN" sz="1400"/>
-          </a:p>
-          <a:p>
-            <a:pPr marL="0" indent="0">
-              <a:buNone/>
-            </a:pPr>
-            <a:r>
-              <a:rPr lang="en-US" altLang="zh-CN" sz="1400">
-                <a:sym typeface="+mn-ea"/>
-              </a:rPr>
-              <a:t>      const values = await formRef.current?.submit();</a:t>
-            </a:r>
-            <a:endParaRPr lang="en-US" altLang="zh-CN" sz="1400"/>
-          </a:p>
-          <a:p>
-            <a:pPr marL="0" indent="0">
-              <a:buNone/>
-            </a:pPr>
-            <a:r>
-              <a:rPr lang="en-US" altLang="zh-CN" sz="1400">
-                <a:sym typeface="+mn-ea"/>
-              </a:rPr>
-              <a:t>      console.log('</a:t>
-            </a:r>
-            <a:r>
-              <a:rPr lang="zh-CN" altLang="en-US" sz="1400">
-                <a:sym typeface="+mn-ea"/>
-              </a:rPr>
-              <a:t>提交数据</a:t>
-            </a:r>
-            <a:r>
-              <a:rPr lang="en-US" altLang="zh-CN" sz="1400">
-                <a:sym typeface="+mn-ea"/>
-              </a:rPr>
-              <a:t>', values);</a:t>
-            </a:r>
-            <a:endParaRPr lang="en-US" altLang="zh-CN" sz="1400"/>
-          </a:p>
-          <a:p>
-            <a:pPr marL="0" indent="0">
-              <a:buNone/>
-            </a:pPr>
-            <a:r>
-              <a:rPr lang="en-US" altLang="zh-CN" sz="1400">
-                <a:sym typeface="+mn-ea"/>
-              </a:rPr>
-              <a:t>    } catch (e) {</a:t>
-            </a:r>
-            <a:endParaRPr lang="en-US" altLang="zh-CN" sz="1400"/>
-          </a:p>
-          <a:p>
-            <a:pPr marL="0" indent="0">
-              <a:buNone/>
-            </a:pPr>
-            <a:r>
-              <a:rPr lang="en-US" altLang="zh-CN" sz="1400">
-                <a:sym typeface="+mn-ea"/>
-              </a:rPr>
-              <a:t>      // </a:t>
-            </a:r>
-            <a:r>
-              <a:rPr lang="zh-CN" altLang="en-US" sz="1400">
-                <a:sym typeface="+mn-ea"/>
-              </a:rPr>
-              <a:t>处理错误</a:t>
-            </a:r>
-            <a:endParaRPr lang="zh-CN" altLang="en-US" sz="1400"/>
-          </a:p>
-          <a:p>
-            <a:pPr marL="0" indent="0">
-              <a:buNone/>
-            </a:pPr>
-            <a:r>
-              <a:rPr lang="en-US" altLang="zh-CN" sz="1400">
-                <a:sym typeface="+mn-ea"/>
-              </a:rPr>
-              <a:t>    }</a:t>
-            </a:r>
-            <a:endParaRPr lang="en-US" altLang="zh-CN" sz="1400"/>
-          </a:p>
-          <a:p>
-            <a:pPr marL="0" indent="0">
-              <a:buNone/>
-            </a:pPr>
-            <a:r>
-              <a:rPr lang="en-US" altLang="zh-CN" sz="1400">
-                <a:sym typeface="+mn-ea"/>
-              </a:rPr>
-              <a:t>  };</a:t>
-            </a:r>
-            <a:endParaRPr lang="en-US" altLang="zh-CN" sz="1400"/>
-          </a:p>
-          <a:p>
-            <a:pPr marL="0" indent="0">
-              <a:buNone/>
-            </a:pPr>
-            <a:r>
-              <a:rPr lang="en-US" altLang="zh-CN" sz="1400">
-                <a:sym typeface="+mn-ea"/>
-              </a:rPr>
-              <a:t>  return (</a:t>
-            </a:r>
-            <a:endParaRPr lang="en-US" altLang="zh-CN" sz="1400"/>
-          </a:p>
-          <a:p>
-            <a:pPr marL="0" indent="0">
-              <a:buNone/>
-            </a:pPr>
-            <a:r>
-              <a:rPr lang="en-US" altLang="zh-CN" sz="1400">
-                <a:sym typeface="+mn-ea"/>
-              </a:rPr>
-              <a:t>    &lt;&gt;</a:t>
-            </a:r>
-            <a:endParaRPr lang="en-US" altLang="zh-CN" sz="1400"/>
-          </a:p>
-          <a:p>
-            <a:pPr marL="0" indent="0">
-              <a:buNone/>
-            </a:pPr>
-            <a:r>
-              <a:rPr lang="en-US" altLang="zh-CN" sz="1400">
-                <a:sym typeface="+mn-ea"/>
-              </a:rPr>
-              <a:t>      &lt;ChildForm ref={formRef} /&gt;</a:t>
-            </a:r>
-            <a:endParaRPr lang="en-US" altLang="zh-CN" sz="1400"/>
-          </a:p>
-          <a:p>
-            <a:pPr marL="0" indent="0">
-              <a:buNone/>
-            </a:pPr>
-            <a:r>
-              <a:rPr lang="en-US" altLang="zh-CN" sz="1400">
-                <a:sym typeface="+mn-ea"/>
-              </a:rPr>
-              <a:t>      &lt;button onClick={handleSubmit}&gt;</a:t>
-            </a:r>
-            <a:r>
-              <a:rPr lang="zh-CN" altLang="en-US" sz="1400">
-                <a:sym typeface="+mn-ea"/>
-              </a:rPr>
-              <a:t>父组件提交</a:t>
-            </a:r>
-            <a:r>
-              <a:rPr lang="en-US" altLang="zh-CN" sz="1400">
-                <a:sym typeface="+mn-ea"/>
-              </a:rPr>
-              <a:t>&lt;/button&gt;</a:t>
-            </a:r>
-            <a:endParaRPr lang="en-US" altLang="zh-CN" sz="1400"/>
-          </a:p>
-          <a:p>
-            <a:pPr marL="0" indent="0">
-              <a:buNone/>
-            </a:pPr>
-            <a:r>
-              <a:rPr lang="en-US" altLang="zh-CN" sz="1400">
-                <a:sym typeface="+mn-ea"/>
-              </a:rPr>
-              <a:t>    &lt;/&gt;</a:t>
-            </a:r>
-            <a:endParaRPr lang="en-US" altLang="zh-CN" sz="1400"/>
-          </a:p>
-          <a:p>
-            <a:pPr marL="0" indent="0">
-              <a:buNone/>
-            </a:pPr>
-            <a:r>
-              <a:rPr lang="en-US" altLang="zh-CN" sz="1400">
-                <a:sym typeface="+mn-ea"/>
-              </a:rPr>
-              <a:t>  );</a:t>
-            </a:r>
-            <a:endParaRPr lang="en-US" altLang="zh-CN" sz="1400"/>
-          </a:p>
-          <a:p>
-            <a:pPr marL="0" indent="0">
-              <a:buNone/>
-            </a:pPr>
-            <a:r>
-              <a:rPr lang="en-US" altLang="zh-CN" sz="1400">
-                <a:sym typeface="+mn-ea"/>
-              </a:rPr>
-              <a:t>}</a:t>
-            </a:r>
-            <a:endParaRPr lang="en-US" altLang="zh-CN" sz="1400"/>
-          </a:p>
-          <a:p>
-            <a:pPr marL="0" indent="0">
-              <a:buNone/>
-            </a:pPr>
-            <a:endParaRPr lang="en-US" altLang="zh-CN" sz="1400"/>
           </a:p>
         </p:txBody>
       </p:sp>
@@ -14377,7 +14175,7 @@
           <a:p>
             <a:r>
               <a:rPr lang="en-US" altLang="zh-CN"/>
-              <a:t>Simple React</a:t>
+              <a:t>useState,useEffect </a:t>
             </a:r>
             <a:endParaRPr lang="en-US" altLang="zh-CN"/>
           </a:p>
@@ -14385,8 +14183,10 @@
       </p:sp>
       <p:sp>
         <p:nvSpPr>
-          <p:cNvPr id="4" name="内容占位符 3"/>
-          <p:cNvSpPr/>
+          <p:cNvPr id="3" name="内容占位符 2"/>
+          <p:cNvSpPr>
+            <a:spLocks noGrp="1"/>
+          </p:cNvSpPr>
           <p:nvPr>
             <p:ph idx="1"/>
           </p:nvPr>
@@ -14432,16 +14232,18 @@
           <a:bodyPr/>
           <a:p>
             <a:r>
-              <a:rPr lang="en-US" altLang="zh-CN"/>
-              <a:t>Simple React</a:t>
-            </a:r>
-            <a:endParaRPr lang="en-US" altLang="zh-CN"/>
+              <a:rPr lang="en-US" altLang="zh-CN">
+                <a:sym typeface="+mn-ea"/>
+              </a:rPr>
+              <a:t>forwardRef</a:t>
+            </a:r>
+            <a:endParaRPr lang="zh-CN" altLang="en-US"/>
           </a:p>
         </p:txBody>
       </p:sp>
       <p:sp>
         <p:nvSpPr>
-          <p:cNvPr id="3" name="内容占位符 2"/>
+          <p:cNvPr id="5" name="内容占位符 4"/>
           <p:cNvSpPr>
             <a:spLocks noGrp="1"/>
           </p:cNvSpPr>
@@ -14451,323 +14253,535 @@
         </p:nvSpPr>
         <p:spPr>
           <a:xfrm>
-            <a:off x="457200" y="1600200"/>
-            <a:ext cx="8229600" cy="5139690"/>
+            <a:off x="251460" y="1557020"/>
+            <a:ext cx="8229600" cy="4525963"/>
           </a:xfrm>
         </p:spPr>
         <p:txBody>
           <a:bodyPr/>
           <a:p>
-            <a:r>
-              <a:rPr lang="en-US" altLang="zh-CN" sz="1400"/>
-              <a:t>&lt;App&gt;</a:t>
-            </a:r>
-            <a:endParaRPr lang="en-US" altLang="zh-CN" sz="1400"/>
-          </a:p>
-          <a:p>
-            <a:r>
-              <a:rPr lang="en-US" altLang="zh-CN" sz="1400"/>
-              <a:t>  &lt;Header /&gt;</a:t>
-            </a:r>
-            <a:endParaRPr lang="en-US" altLang="zh-CN" sz="1400"/>
-          </a:p>
-          <a:p>
-            <a:r>
-              <a:rPr lang="en-US" altLang="zh-CN" sz="1400"/>
-              <a:t>  &lt;Content /&gt;</a:t>
-            </a:r>
-            <a:endParaRPr lang="en-US" altLang="zh-CN" sz="1400"/>
-          </a:p>
-          <a:p>
-            <a:r>
-              <a:rPr lang="en-US" altLang="zh-CN" sz="1400"/>
-              <a:t>&lt;/App&gt;</a:t>
-            </a:r>
-            <a:endParaRPr lang="en-US" altLang="zh-CN" sz="1400"/>
-          </a:p>
-          <a:p>
-            <a:r>
-              <a:rPr lang="zh-CN" altLang="en-US" sz="1400"/>
-              <a:t>递归流程：</a:t>
-            </a:r>
-            <a:endParaRPr lang="en-US" altLang="zh-CN" sz="1400"/>
-          </a:p>
-          <a:p>
-            <a:pPr marL="0" indent="0">
-              <a:buNone/>
-            </a:pPr>
-            <a:r>
-              <a:rPr lang="en-US" altLang="zh-CN" sz="1400"/>
-              <a:t>_render(App) </a:t>
-            </a:r>
-            <a:r>
-              <a:rPr lang="en-US" altLang="en-US" sz="1400"/>
-              <a:t>→</a:t>
-            </a:r>
-            <a:r>
-              <a:rPr lang="en-US" altLang="zh-CN" sz="1400"/>
-              <a:t> </a:t>
-            </a:r>
-            <a:r>
-              <a:rPr lang="zh-CN" altLang="en-US" sz="1400"/>
-              <a:t>发现类组件</a:t>
-            </a:r>
-            <a:r>
-              <a:rPr lang="en-US" altLang="zh-CN" sz="1400"/>
-              <a:t> </a:t>
-            </a:r>
-            <a:r>
-              <a:rPr lang="en-US" altLang="en-US" sz="1400"/>
-              <a:t>→</a:t>
-            </a:r>
-            <a:r>
-              <a:rPr lang="en-US" altLang="zh-CN" sz="1400"/>
-              <a:t> </a:t>
-            </a:r>
-            <a:r>
-              <a:rPr lang="zh-CN" altLang="en-US" sz="1400"/>
-              <a:t>调用</a:t>
-            </a:r>
-            <a:r>
-              <a:rPr lang="en-US" altLang="zh-CN" sz="1400"/>
-              <a:t> App.render()</a:t>
-            </a:r>
-            <a:endParaRPr lang="en-US" altLang="zh-CN" sz="1400"/>
-          </a:p>
-          <a:p>
-            <a:endParaRPr lang="en-US" altLang="zh-CN" sz="1400"/>
-          </a:p>
-          <a:p>
-            <a:pPr marL="0" indent="0">
-              <a:buNone/>
-            </a:pPr>
-            <a:r>
-              <a:rPr lang="zh-CN" altLang="en-US" sz="1400"/>
-              <a:t>得到</a:t>
-            </a:r>
-            <a:r>
-              <a:rPr lang="en-US" altLang="zh-CN" sz="1400"/>
-              <a:t> &lt;div&gt;&lt;Header /&gt;&lt;Content /&gt;&lt;/div&gt;</a:t>
-            </a:r>
-            <a:endParaRPr lang="en-US" altLang="zh-CN" sz="1400"/>
-          </a:p>
-          <a:p>
-            <a:endParaRPr lang="en-US" altLang="zh-CN" sz="1400"/>
-          </a:p>
-          <a:p>
-            <a:pPr marL="0" indent="0">
-              <a:buNone/>
-            </a:pPr>
-            <a:r>
-              <a:rPr lang="en-US" altLang="zh-CN" sz="1400"/>
-              <a:t>_render(div) </a:t>
-            </a:r>
-            <a:r>
-              <a:rPr lang="en-US" altLang="en-US" sz="1400"/>
-              <a:t>→</a:t>
-            </a:r>
-            <a:r>
-              <a:rPr lang="en-US" altLang="zh-CN" sz="1400"/>
-              <a:t> </a:t>
-            </a:r>
-            <a:r>
-              <a:rPr lang="zh-CN" altLang="en-US" sz="1400"/>
-              <a:t>创建</a:t>
-            </a:r>
-            <a:r>
-              <a:rPr lang="en-US" altLang="zh-CN" sz="1400"/>
-              <a:t> &lt;div&gt; </a:t>
-            </a:r>
-            <a:r>
-              <a:rPr lang="en-US" altLang="en-US" sz="1400"/>
-              <a:t>→</a:t>
-            </a:r>
-            <a:r>
-              <a:rPr lang="en-US" altLang="zh-CN" sz="1400"/>
-              <a:t> </a:t>
-            </a:r>
-            <a:r>
-              <a:rPr lang="zh-CN" altLang="en-US" sz="1400"/>
-              <a:t>处理子节点：</a:t>
+            <a:pPr marL="0" indent="0">
+              <a:buNone/>
+            </a:pPr>
+            <a:r>
+              <a:rPr lang="en-US" altLang="zh-CN" sz="1400">
+                <a:sym typeface="+mn-ea"/>
+              </a:rPr>
+              <a:t>// </a:t>
+            </a:r>
+            <a:r>
+              <a:rPr lang="zh-CN" altLang="en-US" sz="1400">
+                <a:sym typeface="+mn-ea"/>
+              </a:rPr>
+              <a:t>子组件</a:t>
             </a:r>
             <a:endParaRPr lang="zh-CN" altLang="en-US" sz="1400"/>
           </a:p>
           <a:p>
-            <a:endParaRPr lang="en-US" altLang="zh-CN" sz="1400"/>
-          </a:p>
-          <a:p>
-            <a:pPr marL="0" indent="0">
-              <a:buNone/>
-            </a:pPr>
-            <a:r>
-              <a:rPr lang="en-US" altLang="zh-CN" sz="1400"/>
-              <a:t>_render(Header) </a:t>
-            </a:r>
-            <a:r>
-              <a:rPr lang="en-US" altLang="en-US" sz="1400"/>
-              <a:t>→</a:t>
-            </a:r>
-            <a:r>
-              <a:rPr lang="en-US" altLang="zh-CN" sz="1400"/>
-              <a:t> </a:t>
-            </a:r>
-            <a:r>
-              <a:rPr lang="zh-CN" altLang="en-US" sz="1400"/>
-              <a:t>函数组件</a:t>
-            </a:r>
-            <a:r>
-              <a:rPr lang="en-US" altLang="zh-CN" sz="1400"/>
-              <a:t> </a:t>
-            </a:r>
-            <a:r>
-              <a:rPr lang="en-US" altLang="en-US" sz="1400"/>
-              <a:t>→</a:t>
-            </a:r>
-            <a:r>
-              <a:rPr lang="en-US" altLang="zh-CN" sz="1400"/>
-              <a:t> </a:t>
-            </a:r>
-            <a:r>
-              <a:rPr lang="zh-CN" altLang="en-US" sz="1400"/>
-              <a:t>调用</a:t>
-            </a:r>
-            <a:r>
-              <a:rPr lang="en-US" altLang="zh-CN" sz="1400"/>
-              <a:t> Header()</a:t>
-            </a:r>
-            <a:endParaRPr lang="en-US" altLang="zh-CN" sz="1400"/>
-          </a:p>
-          <a:p>
-            <a:endParaRPr lang="en-US" altLang="zh-CN" sz="1400"/>
-          </a:p>
-          <a:p>
-            <a:pPr marL="0" indent="0">
-              <a:buNone/>
-            </a:pPr>
-            <a:r>
-              <a:rPr lang="zh-CN" altLang="en-US" sz="1400"/>
-              <a:t>得到</a:t>
-            </a:r>
-            <a:r>
-              <a:rPr lang="en-US" altLang="zh-CN" sz="1400"/>
-              <a:t> &lt;h1&gt;Title&lt;/h1&gt; </a:t>
-            </a:r>
-            <a:r>
-              <a:rPr lang="en-US" altLang="en-US" sz="1400"/>
-              <a:t>→</a:t>
-            </a:r>
-            <a:r>
-              <a:rPr lang="en-US" altLang="zh-CN" sz="1400"/>
-              <a:t> </a:t>
-            </a:r>
-            <a:r>
-              <a:rPr lang="zh-CN" altLang="en-US" sz="1400"/>
-              <a:t>创建</a:t>
-            </a:r>
-            <a:r>
-              <a:rPr lang="en-US" altLang="zh-CN" sz="1400"/>
-              <a:t> &lt;h1&gt;</a:t>
-            </a:r>
-            <a:endParaRPr lang="en-US" altLang="zh-CN" sz="1400"/>
-          </a:p>
-          <a:p>
-            <a:endParaRPr lang="en-US" altLang="zh-CN" sz="1400"/>
-          </a:p>
-          <a:p>
-            <a:pPr marL="0" indent="0">
-              <a:buNone/>
-            </a:pPr>
-            <a:r>
-              <a:rPr lang="en-US" altLang="zh-CN" sz="1400"/>
-              <a:t>_render(Content) </a:t>
-            </a:r>
-            <a:r>
-              <a:rPr lang="en-US" altLang="en-US" sz="1400"/>
-              <a:t>→</a:t>
-            </a:r>
-            <a:r>
-              <a:rPr lang="en-US" altLang="zh-CN" sz="1400"/>
-              <a:t> </a:t>
-            </a:r>
-            <a:r>
-              <a:rPr lang="zh-CN" altLang="en-US" sz="1400"/>
-              <a:t>类组件</a:t>
-            </a:r>
-            <a:r>
-              <a:rPr lang="en-US" altLang="zh-CN" sz="1400"/>
-              <a:t> </a:t>
-            </a:r>
-            <a:r>
-              <a:rPr lang="en-US" altLang="en-US" sz="1400"/>
-              <a:t>→</a:t>
-            </a:r>
-            <a:r>
-              <a:rPr lang="en-US" altLang="zh-CN" sz="1400"/>
-              <a:t> </a:t>
-            </a:r>
-            <a:r>
-              <a:rPr lang="zh-CN" altLang="en-US" sz="1400"/>
-              <a:t>调用</a:t>
-            </a:r>
-            <a:r>
-              <a:rPr lang="en-US" altLang="zh-CN" sz="1400"/>
-              <a:t> Content.render()</a:t>
-            </a:r>
-            <a:endParaRPr lang="en-US" altLang="zh-CN" sz="1400"/>
-          </a:p>
-          <a:p>
-            <a:endParaRPr lang="en-US" altLang="zh-CN" sz="1400"/>
-          </a:p>
-          <a:p>
-            <a:pPr marL="0" indent="0">
-              <a:buNone/>
-            </a:pPr>
-            <a:r>
-              <a:rPr lang="zh-CN" altLang="en-US" sz="1400"/>
-              <a:t>得到</a:t>
-            </a:r>
-            <a:r>
-              <a:rPr lang="en-US" altLang="zh-CN" sz="1400"/>
-              <a:t> &lt;section&gt;...&lt;/section&gt; </a:t>
-            </a:r>
-            <a:r>
-              <a:rPr lang="en-US" altLang="en-US" sz="1400"/>
-              <a:t>→</a:t>
-            </a:r>
-            <a:r>
-              <a:rPr lang="en-US" altLang="zh-CN" sz="1400"/>
-              <a:t> </a:t>
-            </a:r>
-            <a:r>
-              <a:rPr lang="zh-CN" altLang="en-US" sz="1400"/>
-              <a:t>创建</a:t>
-            </a:r>
-            <a:r>
-              <a:rPr lang="en-US" altLang="zh-CN" sz="1400"/>
-              <a:t> &lt;section&gt;</a:t>
-            </a:r>
-            <a:endParaRPr lang="en-US" altLang="zh-CN" sz="1400"/>
-          </a:p>
-          <a:p>
-            <a:endParaRPr lang="en-US" altLang="zh-CN" sz="1400"/>
-          </a:p>
-          <a:p>
-            <a:pPr marL="0" indent="0">
-              <a:buNone/>
-            </a:pPr>
-            <a:r>
-              <a:rPr lang="zh-CN" altLang="en-US" sz="1400"/>
-              <a:t>最终构建完整的</a:t>
-            </a:r>
-            <a:r>
-              <a:rPr lang="en-US" altLang="zh-CN" sz="1400"/>
-              <a:t>DOM</a:t>
-            </a:r>
-            <a:r>
-              <a:rPr lang="zh-CN" altLang="en-US" sz="1400"/>
-              <a:t>树</a:t>
+            <a:pPr marL="0" indent="0">
+              <a:buNone/>
+            </a:pPr>
+            <a:r>
+              <a:rPr lang="en-US" altLang="zh-CN" sz="1400">
+                <a:sym typeface="+mn-ea"/>
+              </a:rPr>
+              <a:t>const </a:t>
+            </a:r>
+            <a:r>
+              <a:rPr lang="en-US" altLang="zh-CN" sz="1400">
+                <a:solidFill>
+                  <a:srgbClr val="FF0000"/>
+                </a:solidFill>
+                <a:sym typeface="+mn-ea"/>
+              </a:rPr>
+              <a:t>ChildForm </a:t>
+            </a:r>
+            <a:r>
+              <a:rPr lang="en-US" altLang="zh-CN" sz="1400">
+                <a:sym typeface="+mn-ea"/>
+              </a:rPr>
+              <a:t>= forwardRef((props, ref) =&gt; {</a:t>
+            </a:r>
+            <a:endParaRPr lang="en-US" altLang="zh-CN" sz="1400"/>
+          </a:p>
+          <a:p>
+            <a:pPr marL="0" indent="0">
+              <a:buNone/>
+            </a:pPr>
+            <a:r>
+              <a:rPr lang="en-US" altLang="zh-CN" sz="1400">
+                <a:sym typeface="+mn-ea"/>
+              </a:rPr>
+              <a:t>  const [form] = Form.useForm();</a:t>
+            </a:r>
+            <a:endParaRPr lang="en-US" altLang="zh-CN" sz="1400"/>
+          </a:p>
+          <a:p>
+            <a:pPr marL="0" indent="0">
+              <a:buNone/>
+            </a:pPr>
+            <a:r>
+              <a:rPr lang="en-US" altLang="zh-CN" sz="1400">
+                <a:sym typeface="+mn-ea"/>
+              </a:rPr>
+              <a:t>  useImperativeHandle(ref, () =&gt; ({</a:t>
+            </a:r>
+            <a:endParaRPr lang="en-US" altLang="zh-CN" sz="1400"/>
+          </a:p>
+          <a:p>
+            <a:pPr marL="0" indent="0">
+              <a:buNone/>
+            </a:pPr>
+            <a:r>
+              <a:rPr lang="en-US" altLang="zh-CN" sz="1400">
+                <a:sym typeface="+mn-ea"/>
+              </a:rPr>
+              <a:t>    submit: async () =&gt; {</a:t>
+            </a:r>
+            <a:endParaRPr lang="en-US" altLang="zh-CN" sz="1400"/>
+          </a:p>
+          <a:p>
+            <a:pPr marL="0" indent="0">
+              <a:buNone/>
+            </a:pPr>
+            <a:r>
+              <a:rPr lang="en-US" altLang="zh-CN" sz="1400">
+                <a:sym typeface="+mn-ea"/>
+              </a:rPr>
+              <a:t>      try { return await form.validateFields();</a:t>
+            </a:r>
+            <a:endParaRPr lang="en-US" altLang="zh-CN" sz="1400"/>
+          </a:p>
+          <a:p>
+            <a:pPr marL="0" indent="0">
+              <a:buNone/>
+            </a:pPr>
+            <a:r>
+              <a:rPr lang="en-US" altLang="zh-CN" sz="1400">
+                <a:sym typeface="+mn-ea"/>
+              </a:rPr>
+              <a:t>      } catch (e) {</a:t>
+            </a:r>
+            <a:endParaRPr lang="en-US" altLang="zh-CN" sz="1400"/>
+          </a:p>
+          <a:p>
+            <a:pPr marL="0" indent="0">
+              <a:buNone/>
+            </a:pPr>
+            <a:r>
+              <a:rPr lang="en-US" altLang="zh-CN" sz="1400">
+                <a:sym typeface="+mn-ea"/>
+              </a:rPr>
+              <a:t>        console.error('</a:t>
+            </a:r>
+            <a:r>
+              <a:rPr lang="zh-CN" altLang="en-US" sz="1400">
+                <a:sym typeface="+mn-ea"/>
+              </a:rPr>
+              <a:t>验证失败</a:t>
+            </a:r>
+            <a:r>
+              <a:rPr lang="en-US" altLang="zh-CN" sz="1400">
+                <a:sym typeface="+mn-ea"/>
+              </a:rPr>
+              <a:t>', e);</a:t>
+            </a:r>
+            <a:endParaRPr lang="en-US" altLang="zh-CN" sz="1400"/>
+          </a:p>
+          <a:p>
+            <a:pPr marL="0" indent="0">
+              <a:buNone/>
+            </a:pPr>
+            <a:r>
+              <a:rPr lang="en-US" altLang="zh-CN" sz="1400">
+                <a:sym typeface="+mn-ea"/>
+              </a:rPr>
+              <a:t>        throw e;</a:t>
+            </a:r>
+            <a:endParaRPr lang="en-US" altLang="zh-CN" sz="1400"/>
+          </a:p>
+          <a:p>
+            <a:pPr marL="0" indent="0">
+              <a:buNone/>
+            </a:pPr>
+            <a:r>
+              <a:rPr lang="en-US" altLang="zh-CN" sz="1400">
+                <a:sym typeface="+mn-ea"/>
+              </a:rPr>
+              <a:t>      }},</a:t>
+            </a:r>
+            <a:endParaRPr lang="en-US" altLang="zh-CN" sz="1400"/>
+          </a:p>
+          <a:p>
+            <a:pPr marL="0" indent="0">
+              <a:buNone/>
+            </a:pPr>
+            <a:r>
+              <a:rPr lang="en-US" altLang="zh-CN" sz="1400">
+                <a:sym typeface="+mn-ea"/>
+              </a:rPr>
+              <a:t>    reset: () =&gt; form.resetFields()</a:t>
+            </a:r>
+            <a:endParaRPr lang="en-US" altLang="zh-CN" sz="1400"/>
+          </a:p>
+          <a:p>
+            <a:pPr marL="0" indent="0">
+              <a:buNone/>
+            </a:pPr>
+            <a:r>
+              <a:rPr lang="en-US" altLang="zh-CN" sz="1400">
+                <a:sym typeface="+mn-ea"/>
+              </a:rPr>
+              <a:t>  }));</a:t>
+            </a:r>
+            <a:endParaRPr lang="en-US" altLang="zh-CN" sz="1400"/>
+          </a:p>
+          <a:p>
+            <a:pPr marL="0" indent="0">
+              <a:buNone/>
+            </a:pPr>
+            <a:r>
+              <a:rPr lang="en-US" altLang="zh-CN" sz="1400">
+                <a:sym typeface="+mn-ea"/>
+              </a:rPr>
+              <a:t>  return &lt;Form form={form}&gt;{/* ... */}&lt;/Form&gt;;</a:t>
+            </a:r>
+            <a:endParaRPr lang="en-US" altLang="zh-CN" sz="1400"/>
+          </a:p>
+          <a:p>
+            <a:pPr marL="0" indent="0">
+              <a:buNone/>
+            </a:pPr>
+            <a:r>
+              <a:rPr lang="en-US" altLang="zh-CN" sz="1400">
+                <a:sym typeface="+mn-ea"/>
+              </a:rPr>
+              <a:t>});</a:t>
+            </a:r>
+            <a:endParaRPr lang="en-US" altLang="zh-CN" sz="1400">
+              <a:sym typeface="+mn-ea"/>
+            </a:endParaRPr>
+          </a:p>
+          <a:p>
+            <a:pPr marL="0" indent="0">
+              <a:buNone/>
+            </a:pPr>
+            <a:endParaRPr lang="en-US" altLang="zh-CN" sz="1600">
+              <a:sym typeface="+mn-ea"/>
+            </a:endParaRPr>
+          </a:p>
+          <a:p>
+            <a:pPr marL="0" indent="0">
+              <a:buNone/>
+            </a:pPr>
+            <a:endParaRPr lang="en-US" altLang="zh-CN" sz="1600"/>
+          </a:p>
+        </p:txBody>
+      </p:sp>
+      <p:sp>
+        <p:nvSpPr>
+          <p:cNvPr id="6" name="文本框 5"/>
+          <p:cNvSpPr txBox="1"/>
+          <p:nvPr/>
+        </p:nvSpPr>
+        <p:spPr>
+          <a:xfrm>
+            <a:off x="5292090" y="1557020"/>
+            <a:ext cx="4572000" cy="4615815"/>
+          </a:xfrm>
+          <a:prstGeom prst="rect">
+            <a:avLst/>
+          </a:prstGeom>
+          <a:noFill/>
+        </p:spPr>
+        <p:txBody>
+          <a:bodyPr wrap="square" rtlCol="0" anchor="t">
+            <a:spAutoFit/>
+          </a:bodyPr>
+          <a:p>
+            <a:pPr marL="0" indent="0">
+              <a:buNone/>
+            </a:pPr>
+            <a:r>
+              <a:rPr lang="en-US" altLang="zh-CN" sz="1400">
+                <a:sym typeface="+mn-ea"/>
+              </a:rPr>
+              <a:t>// </a:t>
+            </a:r>
+            <a:r>
+              <a:rPr lang="zh-CN" altLang="en-US" sz="1400">
+                <a:sym typeface="+mn-ea"/>
+              </a:rPr>
+              <a:t>父组件</a:t>
             </a:r>
             <a:endParaRPr lang="zh-CN" altLang="en-US" sz="1400"/>
+          </a:p>
+          <a:p>
+            <a:pPr marL="0" indent="0">
+              <a:buNone/>
+            </a:pPr>
+            <a:r>
+              <a:rPr lang="en-US" altLang="zh-CN" sz="1400">
+                <a:sym typeface="+mn-ea"/>
+              </a:rPr>
+              <a:t>function </a:t>
+            </a:r>
+            <a:r>
+              <a:rPr lang="en-US" altLang="zh-CN" sz="1400">
+                <a:solidFill>
+                  <a:srgbClr val="FF0000"/>
+                </a:solidFill>
+                <a:sym typeface="+mn-ea"/>
+              </a:rPr>
+              <a:t>Parent</a:t>
+            </a:r>
+            <a:r>
+              <a:rPr lang="en-US" altLang="zh-CN" sz="1400">
+                <a:sym typeface="+mn-ea"/>
+              </a:rPr>
+              <a:t>() {</a:t>
+            </a:r>
+            <a:endParaRPr lang="en-US" altLang="zh-CN" sz="1400"/>
+          </a:p>
+          <a:p>
+            <a:pPr marL="0" indent="0">
+              <a:buNone/>
+            </a:pPr>
+            <a:r>
+              <a:rPr lang="en-US" altLang="zh-CN" sz="1400">
+                <a:sym typeface="+mn-ea"/>
+              </a:rPr>
+              <a:t>  const formRef = useRef();</a:t>
+            </a:r>
+            <a:endParaRPr lang="en-US" altLang="zh-CN" sz="1400"/>
+          </a:p>
+          <a:p>
+            <a:pPr marL="0" indent="0">
+              <a:buNone/>
+            </a:pPr>
+            <a:r>
+              <a:rPr lang="en-US" altLang="zh-CN" sz="1400">
+                <a:sym typeface="+mn-ea"/>
+              </a:rPr>
+              <a:t>  </a:t>
+            </a:r>
+            <a:endParaRPr lang="en-US" altLang="zh-CN" sz="1400"/>
+          </a:p>
+          <a:p>
+            <a:pPr marL="0" indent="0">
+              <a:buNone/>
+            </a:pPr>
+            <a:r>
+              <a:rPr lang="en-US" altLang="zh-CN" sz="1400">
+                <a:sym typeface="+mn-ea"/>
+              </a:rPr>
+              <a:t>  const handleSubmit = async () =&gt; {</a:t>
+            </a:r>
+            <a:endParaRPr lang="en-US" altLang="zh-CN" sz="1400"/>
+          </a:p>
+          <a:p>
+            <a:pPr marL="0" indent="0">
+              <a:buNone/>
+            </a:pPr>
+            <a:r>
+              <a:rPr lang="en-US" altLang="zh-CN" sz="1400">
+                <a:sym typeface="+mn-ea"/>
+              </a:rPr>
+              <a:t>    try {</a:t>
+            </a:r>
+            <a:endParaRPr lang="en-US" altLang="zh-CN" sz="1400"/>
+          </a:p>
+          <a:p>
+            <a:pPr marL="0" indent="0">
+              <a:buNone/>
+            </a:pPr>
+            <a:r>
+              <a:rPr lang="en-US" altLang="zh-CN" sz="1400">
+                <a:sym typeface="+mn-ea"/>
+              </a:rPr>
+              <a:t>      const values = await formRef.current?.submit();</a:t>
+            </a:r>
+            <a:endParaRPr lang="en-US" altLang="zh-CN" sz="1400"/>
+          </a:p>
+          <a:p>
+            <a:pPr marL="0" indent="0">
+              <a:buNone/>
+            </a:pPr>
+            <a:r>
+              <a:rPr lang="en-US" altLang="zh-CN" sz="1400">
+                <a:sym typeface="+mn-ea"/>
+              </a:rPr>
+              <a:t>      console.log('</a:t>
+            </a:r>
+            <a:r>
+              <a:rPr lang="zh-CN" altLang="en-US" sz="1400">
+                <a:sym typeface="+mn-ea"/>
+              </a:rPr>
+              <a:t>提交数据</a:t>
+            </a:r>
+            <a:r>
+              <a:rPr lang="en-US" altLang="zh-CN" sz="1400">
+                <a:sym typeface="+mn-ea"/>
+              </a:rPr>
+              <a:t>', values);</a:t>
+            </a:r>
+            <a:endParaRPr lang="en-US" altLang="zh-CN" sz="1400"/>
+          </a:p>
+          <a:p>
+            <a:pPr marL="0" indent="0">
+              <a:buNone/>
+            </a:pPr>
+            <a:r>
+              <a:rPr lang="en-US" altLang="zh-CN" sz="1400">
+                <a:sym typeface="+mn-ea"/>
+              </a:rPr>
+              <a:t>    } catch (e) {</a:t>
+            </a:r>
+            <a:endParaRPr lang="en-US" altLang="zh-CN" sz="1400"/>
+          </a:p>
+          <a:p>
+            <a:pPr marL="0" indent="0">
+              <a:buNone/>
+            </a:pPr>
+            <a:r>
+              <a:rPr lang="en-US" altLang="zh-CN" sz="1400">
+                <a:sym typeface="+mn-ea"/>
+              </a:rPr>
+              <a:t>      // </a:t>
+            </a:r>
+            <a:r>
+              <a:rPr lang="zh-CN" altLang="en-US" sz="1400">
+                <a:sym typeface="+mn-ea"/>
+              </a:rPr>
+              <a:t>处理错误</a:t>
+            </a:r>
+            <a:endParaRPr lang="zh-CN" altLang="en-US" sz="1400"/>
+          </a:p>
+          <a:p>
+            <a:pPr marL="0" indent="0">
+              <a:buNone/>
+            </a:pPr>
+            <a:r>
+              <a:rPr lang="en-US" altLang="zh-CN" sz="1400">
+                <a:sym typeface="+mn-ea"/>
+              </a:rPr>
+              <a:t>    }</a:t>
+            </a:r>
+            <a:endParaRPr lang="en-US" altLang="zh-CN" sz="1400"/>
+          </a:p>
+          <a:p>
+            <a:pPr marL="0" indent="0">
+              <a:buNone/>
+            </a:pPr>
+            <a:r>
+              <a:rPr lang="en-US" altLang="zh-CN" sz="1400">
+                <a:sym typeface="+mn-ea"/>
+              </a:rPr>
+              <a:t>  };</a:t>
+            </a:r>
+            <a:endParaRPr lang="en-US" altLang="zh-CN" sz="1400"/>
+          </a:p>
+          <a:p>
+            <a:pPr marL="0" indent="0">
+              <a:buNone/>
+            </a:pPr>
+            <a:r>
+              <a:rPr lang="en-US" altLang="zh-CN" sz="1400">
+                <a:sym typeface="+mn-ea"/>
+              </a:rPr>
+              <a:t>  return (</a:t>
+            </a:r>
+            <a:endParaRPr lang="en-US" altLang="zh-CN" sz="1400"/>
+          </a:p>
+          <a:p>
+            <a:pPr marL="0" indent="0">
+              <a:buNone/>
+            </a:pPr>
+            <a:r>
+              <a:rPr lang="en-US" altLang="zh-CN" sz="1400">
+                <a:sym typeface="+mn-ea"/>
+              </a:rPr>
+              <a:t>    &lt;&gt;</a:t>
+            </a:r>
+            <a:endParaRPr lang="en-US" altLang="zh-CN" sz="1400"/>
+          </a:p>
+          <a:p>
+            <a:pPr marL="0" indent="0">
+              <a:buNone/>
+            </a:pPr>
+            <a:r>
+              <a:rPr lang="en-US" altLang="zh-CN" sz="1400">
+                <a:sym typeface="+mn-ea"/>
+              </a:rPr>
+              <a:t>      &lt;ChildForm ref={formRef} /&gt;</a:t>
+            </a:r>
+            <a:endParaRPr lang="en-US" altLang="zh-CN" sz="1400"/>
+          </a:p>
+          <a:p>
+            <a:pPr marL="0" indent="0">
+              <a:buNone/>
+            </a:pPr>
+            <a:r>
+              <a:rPr lang="en-US" altLang="zh-CN" sz="1400">
+                <a:sym typeface="+mn-ea"/>
+              </a:rPr>
+              <a:t>      &lt;button onClick={handleSubmit}&gt;</a:t>
+            </a:r>
+            <a:r>
+              <a:rPr lang="zh-CN" altLang="en-US" sz="1400">
+                <a:sym typeface="+mn-ea"/>
+              </a:rPr>
+              <a:t>父组件提交</a:t>
+            </a:r>
+            <a:r>
+              <a:rPr lang="en-US" altLang="zh-CN" sz="1400">
+                <a:sym typeface="+mn-ea"/>
+              </a:rPr>
+              <a:t>&lt;/button&gt;</a:t>
+            </a:r>
+            <a:endParaRPr lang="en-US" altLang="zh-CN" sz="1400"/>
+          </a:p>
+          <a:p>
+            <a:pPr marL="0" indent="0">
+              <a:buNone/>
+            </a:pPr>
+            <a:r>
+              <a:rPr lang="en-US" altLang="zh-CN" sz="1400">
+                <a:sym typeface="+mn-ea"/>
+              </a:rPr>
+              <a:t>    &lt;/&gt;</a:t>
+            </a:r>
+            <a:endParaRPr lang="en-US" altLang="zh-CN" sz="1400"/>
+          </a:p>
+          <a:p>
+            <a:pPr marL="0" indent="0">
+              <a:buNone/>
+            </a:pPr>
+            <a:r>
+              <a:rPr lang="en-US" altLang="zh-CN" sz="1400">
+                <a:sym typeface="+mn-ea"/>
+              </a:rPr>
+              <a:t>  );</a:t>
+            </a:r>
+            <a:endParaRPr lang="en-US" altLang="zh-CN" sz="1400"/>
+          </a:p>
+          <a:p>
+            <a:pPr marL="0" indent="0">
+              <a:buNone/>
+            </a:pPr>
+            <a:r>
+              <a:rPr lang="en-US" altLang="zh-CN" sz="1400">
+                <a:sym typeface="+mn-ea"/>
+              </a:rPr>
+              <a:t>}</a:t>
+            </a:r>
+            <a:endParaRPr lang="en-US" altLang="zh-CN" sz="1400"/>
+          </a:p>
+          <a:p>
+            <a:pPr marL="0" indent="0">
+              <a:buNone/>
+            </a:pPr>
+            <a:endParaRPr lang="en-US" altLang="zh-CN" sz="1400"/>
           </a:p>
         </p:txBody>
       </p:sp>

</xml_diff>